<commit_message>
make seconed iteration presentetion
</commit_message>
<xml_diff>
--- a/seconed_iteration.pptx
+++ b/seconed_iteration.pptx
@@ -8828,7 +8828,7 @@
           <a:p>
             <a:fld id="{03573BAD-26BF-45FC-A316-E1836D95B7B8}" type="datetimeFigureOut">
               <a:rPr lang="en-US" smtClean="0"/>
-              <a:t>1/6/2025</a:t>
+              <a:t>1/20/2025</a:t>
             </a:fld>
             <a:endParaRPr lang="en-US"/>
           </a:p>
@@ -9668,7 +9668,7 @@
           <a:p>
             <a:fld id="{ACE0332F-FCE7-43B8-8B44-ECBD436CDFD7}" type="datetimeFigureOut">
               <a:rPr lang="he-IL" smtClean="0"/>
-              <a:t>ו'/טבת/תשפ"ה</a:t>
+              <a:t>כ'/טבת/תשפ"ה</a:t>
             </a:fld>
             <a:endParaRPr lang="he-IL"/>
           </a:p>
@@ -9852,7 +9852,7 @@
           <a:p>
             <a:fld id="{ACE0332F-FCE7-43B8-8B44-ECBD436CDFD7}" type="datetimeFigureOut">
               <a:rPr lang="he-IL" smtClean="0"/>
-              <a:t>ו'/טבת/תשפ"ה</a:t>
+              <a:t>כ'/טבת/תשפ"ה</a:t>
             </a:fld>
             <a:endParaRPr lang="he-IL"/>
           </a:p>
@@ -10046,7 +10046,7 @@
           <a:p>
             <a:fld id="{ACE0332F-FCE7-43B8-8B44-ECBD436CDFD7}" type="datetimeFigureOut">
               <a:rPr lang="he-IL" smtClean="0"/>
-              <a:t>ו'/טבת/תשפ"ה</a:t>
+              <a:t>כ'/טבת/תשפ"ה</a:t>
             </a:fld>
             <a:endParaRPr lang="he-IL"/>
           </a:p>
@@ -10230,7 +10230,7 @@
           <a:p>
             <a:fld id="{ACE0332F-FCE7-43B8-8B44-ECBD436CDFD7}" type="datetimeFigureOut">
               <a:rPr lang="he-IL" smtClean="0"/>
-              <a:t>ו'/טבת/תשפ"ה</a:t>
+              <a:t>כ'/טבת/תשפ"ה</a:t>
             </a:fld>
             <a:endParaRPr lang="he-IL"/>
           </a:p>
@@ -10491,7 +10491,7 @@
           <a:p>
             <a:fld id="{ACE0332F-FCE7-43B8-8B44-ECBD436CDFD7}" type="datetimeFigureOut">
               <a:rPr lang="he-IL" smtClean="0"/>
-              <a:t>ו'/טבת/תשפ"ה</a:t>
+              <a:t>כ'/טבת/תשפ"ה</a:t>
             </a:fld>
             <a:endParaRPr lang="he-IL"/>
           </a:p>
@@ -10736,7 +10736,7 @@
           <a:p>
             <a:fld id="{ACE0332F-FCE7-43B8-8B44-ECBD436CDFD7}" type="datetimeFigureOut">
               <a:rPr lang="he-IL" smtClean="0"/>
-              <a:t>ו'/טבת/תשפ"ה</a:t>
+              <a:t>כ'/טבת/תשפ"ה</a:t>
             </a:fld>
             <a:endParaRPr lang="he-IL"/>
           </a:p>
@@ -11116,7 +11116,7 @@
           <a:p>
             <a:fld id="{ACE0332F-FCE7-43B8-8B44-ECBD436CDFD7}" type="datetimeFigureOut">
               <a:rPr lang="he-IL" smtClean="0"/>
-              <a:t>ו'/טבת/תשפ"ה</a:t>
+              <a:t>כ'/טבת/תשפ"ה</a:t>
             </a:fld>
             <a:endParaRPr lang="he-IL"/>
           </a:p>
@@ -11249,7 +11249,7 @@
           <a:p>
             <a:fld id="{ACE0332F-FCE7-43B8-8B44-ECBD436CDFD7}" type="datetimeFigureOut">
               <a:rPr lang="he-IL" smtClean="0"/>
-              <a:t>ו'/טבת/תשפ"ה</a:t>
+              <a:t>כ'/טבת/תשפ"ה</a:t>
             </a:fld>
             <a:endParaRPr lang="he-IL"/>
           </a:p>
@@ -11360,7 +11360,7 @@
           <a:p>
             <a:fld id="{ACE0332F-FCE7-43B8-8B44-ECBD436CDFD7}" type="datetimeFigureOut">
               <a:rPr lang="he-IL" smtClean="0"/>
-              <a:t>ו'/טבת/תשפ"ה</a:t>
+              <a:t>כ'/טבת/תשפ"ה</a:t>
             </a:fld>
             <a:endParaRPr lang="he-IL"/>
           </a:p>
@@ -11651,7 +11651,7 @@
           <a:p>
             <a:fld id="{ACE0332F-FCE7-43B8-8B44-ECBD436CDFD7}" type="datetimeFigureOut">
               <a:rPr lang="he-IL" smtClean="0"/>
-              <a:t>ו'/טבת/תשפ"ה</a:t>
+              <a:t>כ'/טבת/תשפ"ה</a:t>
             </a:fld>
             <a:endParaRPr lang="he-IL"/>
           </a:p>
@@ -11919,7 +11919,7 @@
           <a:p>
             <a:fld id="{ACE0332F-FCE7-43B8-8B44-ECBD436CDFD7}" type="datetimeFigureOut">
               <a:rPr lang="he-IL" smtClean="0"/>
-              <a:t>ו'/טבת/תשפ"ה</a:t>
+              <a:t>כ'/טבת/תשפ"ה</a:t>
             </a:fld>
             <a:endParaRPr lang="he-IL"/>
           </a:p>
@@ -14467,10 +14467,10 @@
       </p:sp>
       <p:pic>
         <p:nvPicPr>
-          <p:cNvPr id="7" name="תמונה 6" descr="תמונה שמכילה ירק, בצל&#10;&#10;התיאור נוצר באופן אוטומטי">
+          <p:cNvPr id="5" name="Picture 4" descr="A logo with a circle and rings around it&#10;&#10;Description automatically generated">
             <a:extLst>
               <a:ext uri="{FF2B5EF4-FFF2-40B4-BE49-F238E27FC236}">
-                <a16:creationId xmlns:a16="http://schemas.microsoft.com/office/drawing/2014/main" id="{9403E0CE-3E47-BF06-2603-41D7AC996B37}"/>
+                <a16:creationId xmlns:a16="http://schemas.microsoft.com/office/drawing/2014/main" id="{AD61D411-C0AA-73DC-7046-02701BE09083}"/>
               </a:ext>
             </a:extLst>
           </p:cNvPr>
@@ -14481,20 +14481,20 @@
         </p:nvPicPr>
         <p:blipFill>
           <a:blip r:embed="rId3">
-            <a:alphaModFix amt="50000"/>
             <a:extLst>
               <a:ext uri="{28A0092B-C50C-407E-A947-70E740481C1C}">
                 <a14:useLocalDpi xmlns:a14="http://schemas.microsoft.com/office/drawing/2010/main" val="0"/>
               </a:ext>
             </a:extLst>
           </a:blip>
-          <a:srcRect r="2223" b="1"/>
-          <a:stretch/>
+          <a:stretch>
+            <a:fillRect/>
+          </a:stretch>
         </p:blipFill>
         <p:spPr>
           <a:xfrm>
-            <a:off x="20" y="1"/>
-            <a:ext cx="12191980" cy="6857999"/>
+            <a:off x="0" y="0"/>
+            <a:ext cx="12192000" cy="6857999"/>
           </a:xfrm>
           <a:prstGeom prst="rect">
             <a:avLst/>
@@ -14503,50 +14503,38 @@
       </p:pic>
       <p:sp>
         <p:nvSpPr>
-          <p:cNvPr id="2" name="כותרת 1"/>
-          <p:cNvSpPr>
-            <a:spLocks noGrp="1"/>
-          </p:cNvSpPr>
-          <p:nvPr>
-            <p:ph type="ctrTitle"/>
-          </p:nvPr>
+          <p:cNvPr id="9" name="TextBox 8">
+            <a:extLst>
+              <a:ext uri="{FF2B5EF4-FFF2-40B4-BE49-F238E27FC236}">
+                <a16:creationId xmlns:a16="http://schemas.microsoft.com/office/drawing/2014/main" id="{36F89CA0-77AE-51C8-5D1C-740B00F6CE44}"/>
+              </a:ext>
+            </a:extLst>
+          </p:cNvPr>
+          <p:cNvSpPr txBox="1"/>
+          <p:nvPr/>
         </p:nvSpPr>
         <p:spPr>
           <a:xfrm>
-            <a:off x="1524000" y="2910348"/>
-            <a:ext cx="9144000" cy="1112532"/>
+            <a:off x="4085863" y="5701255"/>
+            <a:ext cx="3784921" cy="954107"/>
           </a:xfrm>
+          <a:prstGeom prst="rect">
+            <a:avLst/>
+          </a:prstGeom>
+          <a:noFill/>
         </p:spPr>
         <p:txBody>
-          <a:bodyPr>
-            <a:normAutofit/>
+          <a:bodyPr wrap="square" rtlCol="1">
+            <a:spAutoFit/>
           </a:bodyPr>
           <a:lstStyle/>
           <a:p>
+            <a:pPr algn="ctr"/>
             <a:r>
-              <a:rPr lang="he-IL" dirty="0">
-                <a:solidFill>
-                  <a:srgbClr val="FFFFFF"/>
-                </a:solidFill>
-              </a:rPr>
-              <a:t>הצגת ספרינט </a:t>
+              <a:rPr lang="en-US" sz="2800" dirty="0"/>
+              <a:t>Presentors Liam &amp; Gavriel</a:t>
             </a:r>
-            <a:r>
-              <a:rPr lang="en-US" dirty="0">
-                <a:solidFill>
-                  <a:srgbClr val="FFFFFF"/>
-                </a:solidFill>
-              </a:rPr>
-              <a:t>II</a:t>
-            </a:r>
-            <a:r>
-              <a:rPr lang="he-IL" dirty="0">
-                <a:solidFill>
-                  <a:srgbClr val="FFFFFF"/>
-                </a:solidFill>
-              </a:rPr>
-              <a:t> </a:t>
-            </a:r>
+            <a:endParaRPr lang="he-IL" sz="2800" dirty="0"/>
           </a:p>
         </p:txBody>
       </p:sp>
@@ -14560,98 +14548,6 @@
   <p:clrMapOvr>
     <a:masterClrMapping/>
   </p:clrMapOvr>
-  <p:timing>
-    <p:tnLst>
-      <p:par>
-        <p:cTn id="1" dur="indefinite" restart="never" nodeType="tmRoot">
-          <p:childTnLst>
-            <p:seq concurrent="1" nextAc="seek">
-              <p:cTn id="2" dur="indefinite" nodeType="mainSeq">
-                <p:childTnLst>
-                  <p:par>
-                    <p:cTn id="3" fill="hold">
-                      <p:stCondLst>
-                        <p:cond delay="indefinite"/>
-                        <p:cond evt="onBegin" delay="0">
-                          <p:tn val="2"/>
-                        </p:cond>
-                      </p:stCondLst>
-                      <p:childTnLst>
-                        <p:par>
-                          <p:cTn id="4" fill="hold">
-                            <p:stCondLst>
-                              <p:cond delay="0"/>
-                            </p:stCondLst>
-                            <p:childTnLst>
-                              <p:par>
-                                <p:cTn id="5" presetID="10" presetClass="entr" presetSubtype="0" fill="hold" grpId="0" nodeType="withEffect">
-                                  <p:stCondLst>
-                                    <p:cond delay="1000"/>
-                                  </p:stCondLst>
-                                  <p:iterate type="lt">
-                                    <p:tmPct val="10000"/>
-                                  </p:iterate>
-                                  <p:childTnLst>
-                                    <p:set>
-                                      <p:cBhvr>
-                                        <p:cTn id="6" dur="1" fill="hold">
-                                          <p:stCondLst>
-                                            <p:cond delay="0"/>
-                                          </p:stCondLst>
-                                        </p:cTn>
-                                        <p:tgtEl>
-                                          <p:spTgt spid="2"/>
-                                        </p:tgtEl>
-                                        <p:attrNameLst>
-                                          <p:attrName>style.visibility</p:attrName>
-                                        </p:attrNameLst>
-                                      </p:cBhvr>
-                                      <p:to>
-                                        <p:strVal val="visible"/>
-                                      </p:to>
-                                    </p:set>
-                                    <p:animEffect transition="in" filter="fade">
-                                      <p:cBhvr>
-                                        <p:cTn id="7" dur="400"/>
-                                        <p:tgtEl>
-                                          <p:spTgt spid="2"/>
-                                        </p:tgtEl>
-                                      </p:cBhvr>
-                                    </p:animEffect>
-                                  </p:childTnLst>
-                                </p:cTn>
-                              </p:par>
-                            </p:childTnLst>
-                          </p:cTn>
-                        </p:par>
-                      </p:childTnLst>
-                    </p:cTn>
-                  </p:par>
-                </p:childTnLst>
-              </p:cTn>
-              <p:prevCondLst>
-                <p:cond evt="onPrev" delay="0">
-                  <p:tgtEl>
-                    <p:sldTgt/>
-                  </p:tgtEl>
-                </p:cond>
-              </p:prevCondLst>
-              <p:nextCondLst>
-                <p:cond evt="onNext" delay="0">
-                  <p:tgtEl>
-                    <p:sldTgt/>
-                  </p:tgtEl>
-                </p:cond>
-              </p:nextCondLst>
-            </p:seq>
-          </p:childTnLst>
-        </p:cTn>
-      </p:par>
-    </p:tnLst>
-    <p:bldLst>
-      <p:bldP spid="2" grpId="0"/>
-    </p:bldLst>
-  </p:timing>
 </p:sld>
 </file>
 

</xml_diff>